<commit_message>
implement generic dense matrix routines
</commit_message>
<xml_diff>
--- a/doc/PyBrOpt_architecture_xxlarge.pptx
+++ b/doc/PyBrOpt_architecture_xxlarge.pptx
@@ -243,7 +243,7 @@
           <a:p>
             <a:fld id="{4ABB62A1-A8C1-4D79-8B43-7E30B32CC80F}" type="datetimeFigureOut">
               <a:rPr lang="en-US" smtClean="0"/>
-              <a:t>3/12/2021</a:t>
+              <a:t>3/26/2021</a:t>
             </a:fld>
             <a:endParaRPr lang="en-US"/>
           </a:p>
@@ -413,7 +413,7 @@
           <a:p>
             <a:fld id="{4ABB62A1-A8C1-4D79-8B43-7E30B32CC80F}" type="datetimeFigureOut">
               <a:rPr lang="en-US" smtClean="0"/>
-              <a:t>3/12/2021</a:t>
+              <a:t>3/26/2021</a:t>
             </a:fld>
             <a:endParaRPr lang="en-US"/>
           </a:p>
@@ -593,7 +593,7 @@
           <a:p>
             <a:fld id="{4ABB62A1-A8C1-4D79-8B43-7E30B32CC80F}" type="datetimeFigureOut">
               <a:rPr lang="en-US" smtClean="0"/>
-              <a:t>3/12/2021</a:t>
+              <a:t>3/26/2021</a:t>
             </a:fld>
             <a:endParaRPr lang="en-US"/>
           </a:p>
@@ -763,7 +763,7 @@
           <a:p>
             <a:fld id="{4ABB62A1-A8C1-4D79-8B43-7E30B32CC80F}" type="datetimeFigureOut">
               <a:rPr lang="en-US" smtClean="0"/>
-              <a:t>3/12/2021</a:t>
+              <a:t>3/26/2021</a:t>
             </a:fld>
             <a:endParaRPr lang="en-US"/>
           </a:p>
@@ -1007,7 +1007,7 @@
           <a:p>
             <a:fld id="{4ABB62A1-A8C1-4D79-8B43-7E30B32CC80F}" type="datetimeFigureOut">
               <a:rPr lang="en-US" smtClean="0"/>
-              <a:t>3/12/2021</a:t>
+              <a:t>3/26/2021</a:t>
             </a:fld>
             <a:endParaRPr lang="en-US"/>
           </a:p>
@@ -1239,7 +1239,7 @@
           <a:p>
             <a:fld id="{4ABB62A1-A8C1-4D79-8B43-7E30B32CC80F}" type="datetimeFigureOut">
               <a:rPr lang="en-US" smtClean="0"/>
-              <a:t>3/12/2021</a:t>
+              <a:t>3/26/2021</a:t>
             </a:fld>
             <a:endParaRPr lang="en-US"/>
           </a:p>
@@ -1606,7 +1606,7 @@
           <a:p>
             <a:fld id="{4ABB62A1-A8C1-4D79-8B43-7E30B32CC80F}" type="datetimeFigureOut">
               <a:rPr lang="en-US" smtClean="0"/>
-              <a:t>3/12/2021</a:t>
+              <a:t>3/26/2021</a:t>
             </a:fld>
             <a:endParaRPr lang="en-US"/>
           </a:p>
@@ -1724,7 +1724,7 @@
           <a:p>
             <a:fld id="{4ABB62A1-A8C1-4D79-8B43-7E30B32CC80F}" type="datetimeFigureOut">
               <a:rPr lang="en-US" smtClean="0"/>
-              <a:t>3/12/2021</a:t>
+              <a:t>3/26/2021</a:t>
             </a:fld>
             <a:endParaRPr lang="en-US"/>
           </a:p>
@@ -1819,7 +1819,7 @@
           <a:p>
             <a:fld id="{4ABB62A1-A8C1-4D79-8B43-7E30B32CC80F}" type="datetimeFigureOut">
               <a:rPr lang="en-US" smtClean="0"/>
-              <a:t>3/12/2021</a:t>
+              <a:t>3/26/2021</a:t>
             </a:fld>
             <a:endParaRPr lang="en-US"/>
           </a:p>
@@ -2096,7 +2096,7 @@
           <a:p>
             <a:fld id="{4ABB62A1-A8C1-4D79-8B43-7E30B32CC80F}" type="datetimeFigureOut">
               <a:rPr lang="en-US" smtClean="0"/>
-              <a:t>3/12/2021</a:t>
+              <a:t>3/26/2021</a:t>
             </a:fld>
             <a:endParaRPr lang="en-US"/>
           </a:p>
@@ -2353,7 +2353,7 @@
           <a:p>
             <a:fld id="{4ABB62A1-A8C1-4D79-8B43-7E30B32CC80F}" type="datetimeFigureOut">
               <a:rPr lang="en-US" smtClean="0"/>
-              <a:t>3/12/2021</a:t>
+              <a:t>3/26/2021</a:t>
             </a:fld>
             <a:endParaRPr lang="en-US"/>
           </a:p>
@@ -2566,7 +2566,7 @@
           <a:p>
             <a:fld id="{4ABB62A1-A8C1-4D79-8B43-7E30B32CC80F}" type="datetimeFigureOut">
               <a:rPr lang="en-US" smtClean="0"/>
-              <a:t>3/12/2021</a:t>
+              <a:t>3/26/2021</a:t>
             </a:fld>
             <a:endParaRPr lang="en-US"/>
           </a:p>
@@ -2985,8 +2985,8 @@
         </p:nvSpPr>
         <p:spPr>
           <a:xfrm>
-            <a:off x="8483611" y="327240"/>
-            <a:ext cx="5758988" cy="1863720"/>
+            <a:off x="8483611" y="159691"/>
+            <a:ext cx="8124178" cy="2031269"/>
           </a:xfrm>
           <a:prstGeom prst="rect">
             <a:avLst/>
@@ -10690,703 +10690,6 @@
           <a:fontRef idx="minor"/>
         </p:style>
       </p:sp>
-      <p:grpSp>
-        <p:nvGrpSpPr>
-          <p:cNvPr id="157" name="Group 195">
-            <a:extLst>
-              <a:ext uri="{FF2B5EF4-FFF2-40B4-BE49-F238E27FC236}">
-                <a16:creationId xmlns:a16="http://schemas.microsoft.com/office/drawing/2014/main" id="{965B2282-9036-4D1E-AB90-918DD3F330C0}"/>
-              </a:ext>
-            </a:extLst>
-          </p:cNvPr>
-          <p:cNvGrpSpPr/>
-          <p:nvPr/>
-        </p:nvGrpSpPr>
-        <p:grpSpPr>
-          <a:xfrm>
-            <a:off x="10151198" y="779760"/>
-            <a:ext cx="3864960" cy="1222920"/>
-            <a:chOff x="7297920" y="779760"/>
-            <a:chExt cx="3864960" cy="1222920"/>
-          </a:xfrm>
-        </p:grpSpPr>
-        <p:grpSp>
-          <p:nvGrpSpPr>
-            <p:cNvPr id="158" name="Group 196">
-              <a:extLst>
-                <a:ext uri="{FF2B5EF4-FFF2-40B4-BE49-F238E27FC236}">
-                  <a16:creationId xmlns:a16="http://schemas.microsoft.com/office/drawing/2014/main" id="{91029BE8-5293-4CF4-900F-48BD42A3071B}"/>
-                </a:ext>
-              </a:extLst>
-            </p:cNvPr>
-            <p:cNvGrpSpPr/>
-            <p:nvPr/>
-          </p:nvGrpSpPr>
-          <p:grpSpPr>
-            <a:xfrm>
-              <a:off x="7297920" y="779760"/>
-              <a:ext cx="3864960" cy="1222920"/>
-              <a:chOff x="7297920" y="779760"/>
-              <a:chExt cx="3864960" cy="1222920"/>
-            </a:xfrm>
-          </p:grpSpPr>
-          <p:grpSp>
-            <p:nvGrpSpPr>
-              <p:cNvPr id="161" name="Group 197">
-                <a:extLst>
-                  <a:ext uri="{FF2B5EF4-FFF2-40B4-BE49-F238E27FC236}">
-                    <a16:creationId xmlns:a16="http://schemas.microsoft.com/office/drawing/2014/main" id="{AD7CB44A-776B-4979-8111-75733A186401}"/>
-                  </a:ext>
-                </a:extLst>
-              </p:cNvPr>
-              <p:cNvGrpSpPr/>
-              <p:nvPr/>
-            </p:nvGrpSpPr>
-            <p:grpSpPr>
-              <a:xfrm>
-                <a:off x="7297920" y="779760"/>
-                <a:ext cx="3864960" cy="1222920"/>
-                <a:chOff x="7297920" y="779760"/>
-                <a:chExt cx="3864960" cy="1222920"/>
-              </a:xfrm>
-            </p:grpSpPr>
-            <p:sp>
-              <p:nvSpPr>
-                <p:cNvPr id="167" name="CustomShape 198">
-                  <a:extLst>
-                    <a:ext uri="{FF2B5EF4-FFF2-40B4-BE49-F238E27FC236}">
-                      <a16:creationId xmlns:a16="http://schemas.microsoft.com/office/drawing/2014/main" id="{3945F0D2-A466-4348-AAB7-A051F161EBA4}"/>
-                    </a:ext>
-                  </a:extLst>
-                </p:cNvPr>
-                <p:cNvSpPr/>
-                <p:nvPr/>
-              </p:nvSpPr>
-              <p:spPr>
-                <a:xfrm>
-                  <a:off x="7297920" y="779760"/>
-                  <a:ext cx="3864960" cy="1222920"/>
-                </a:xfrm>
-                <a:prstGeom prst="rect">
-                  <a:avLst/>
-                </a:prstGeom>
-                <a:solidFill>
-                  <a:schemeClr val="accent6">
-                    <a:alpha val="50000"/>
-                  </a:schemeClr>
-                </a:solidFill>
-                <a:ln w="0">
-                  <a:noFill/>
-                </a:ln>
-              </p:spPr>
-              <p:style>
-                <a:lnRef idx="0">
-                  <a:scrgbClr r="0" g="0" b="0"/>
-                </a:lnRef>
-                <a:fillRef idx="0">
-                  <a:scrgbClr r="0" g="0" b="0"/>
-                </a:fillRef>
-                <a:effectRef idx="0">
-                  <a:scrgbClr r="0" g="0" b="0"/>
-                </a:effectRef>
-                <a:fontRef idx="minor"/>
-              </p:style>
-            </p:sp>
-            <p:sp>
-              <p:nvSpPr>
-                <p:cNvPr id="168" name="CustomShape 199">
-                  <a:extLst>
-                    <a:ext uri="{FF2B5EF4-FFF2-40B4-BE49-F238E27FC236}">
-                      <a16:creationId xmlns:a16="http://schemas.microsoft.com/office/drawing/2014/main" id="{141890E6-23CF-4642-A4D9-B5C28134A114}"/>
-                    </a:ext>
-                  </a:extLst>
-                </p:cNvPr>
-                <p:cNvSpPr/>
-                <p:nvPr/>
-              </p:nvSpPr>
-              <p:spPr>
-                <a:xfrm>
-                  <a:off x="8372520" y="1329480"/>
-                  <a:ext cx="1113120" cy="182520"/>
-                </a:xfrm>
-                <a:prstGeom prst="rect">
-                  <a:avLst/>
-                </a:prstGeom>
-                <a:solidFill>
-                  <a:srgbClr val="ED7D31"/>
-                </a:solidFill>
-                <a:ln>
-                  <a:solidFill>
-                    <a:srgbClr val="AF5C24"/>
-                  </a:solidFill>
-                </a:ln>
-              </p:spPr>
-              <p:style>
-                <a:lnRef idx="2">
-                  <a:schemeClr val="accent2">
-                    <a:shade val="50000"/>
-                  </a:schemeClr>
-                </a:lnRef>
-                <a:fillRef idx="1">
-                  <a:schemeClr val="accent2"/>
-                </a:fillRef>
-                <a:effectRef idx="0">
-                  <a:schemeClr val="accent2"/>
-                </a:effectRef>
-                <a:fontRef idx="minor"/>
-              </p:style>
-              <p:txBody>
-                <a:bodyPr lIns="90000" tIns="45000" rIns="90000" bIns="45000" anchor="ctr">
-                  <a:noAutofit/>
-                </a:bodyPr>
-                <a:lstStyle/>
-                <a:p>
-                  <a:pPr algn="ctr">
-                    <a:lnSpc>
-                      <a:spcPct val="100000"/>
-                    </a:lnSpc>
-                  </a:pPr>
-                  <a:r>
-                    <a:rPr lang="en-US" sz="1200" b="0" strike="noStrike" spc="-1">
-                      <a:solidFill>
-                        <a:srgbClr val="FFFFFF"/>
-                      </a:solidFill>
-                      <a:latin typeface="Calibri"/>
-                    </a:rPr>
-                    <a:t>SortableMatrix</a:t>
-                  </a:r>
-                  <a:endParaRPr lang="en-US" sz="1200" b="0" strike="noStrike" spc="-1">
-                    <a:latin typeface="Arial"/>
-                  </a:endParaRPr>
-                </a:p>
-              </p:txBody>
-            </p:sp>
-            <p:sp>
-              <p:nvSpPr>
-                <p:cNvPr id="169" name="CustomShape 200">
-                  <a:extLst>
-                    <a:ext uri="{FF2B5EF4-FFF2-40B4-BE49-F238E27FC236}">
-                      <a16:creationId xmlns:a16="http://schemas.microsoft.com/office/drawing/2014/main" id="{9EC95AB6-0C95-4652-8E99-5E1BD7CB7FB1}"/>
-                    </a:ext>
-                  </a:extLst>
-                </p:cNvPr>
-                <p:cNvSpPr/>
-                <p:nvPr/>
-              </p:nvSpPr>
-              <p:spPr>
-                <a:xfrm>
-                  <a:off x="7378560" y="1331640"/>
-                  <a:ext cx="630000" cy="182520"/>
-                </a:xfrm>
-                <a:prstGeom prst="rect">
-                  <a:avLst/>
-                </a:prstGeom>
-                <a:solidFill>
-                  <a:srgbClr val="ED7D31"/>
-                </a:solidFill>
-                <a:ln>
-                  <a:solidFill>
-                    <a:srgbClr val="AF5C24"/>
-                  </a:solidFill>
-                </a:ln>
-              </p:spPr>
-              <p:style>
-                <a:lnRef idx="2">
-                  <a:schemeClr val="accent2">
-                    <a:shade val="50000"/>
-                  </a:schemeClr>
-                </a:lnRef>
-                <a:fillRef idx="1">
-                  <a:schemeClr val="accent2"/>
-                </a:fillRef>
-                <a:effectRef idx="0">
-                  <a:schemeClr val="accent2"/>
-                </a:effectRef>
-                <a:fontRef idx="minor"/>
-              </p:style>
-              <p:txBody>
-                <a:bodyPr lIns="90000" tIns="45000" rIns="90000" bIns="45000" anchor="ctr">
-                  <a:noAutofit/>
-                </a:bodyPr>
-                <a:lstStyle/>
-                <a:p>
-                  <a:pPr algn="ctr">
-                    <a:lnSpc>
-                      <a:spcPct val="100000"/>
-                    </a:lnSpc>
-                  </a:pPr>
-                  <a:r>
-                    <a:rPr lang="en-US" sz="1200" b="0" strike="noStrike" spc="-1">
-                      <a:solidFill>
-                        <a:srgbClr val="FFFFFF"/>
-                      </a:solidFill>
-                      <a:latin typeface="Calibri"/>
-                    </a:rPr>
-                    <a:t>Matrix</a:t>
-                  </a:r>
-                  <a:endParaRPr lang="en-US" sz="1200" b="0" strike="noStrike" spc="-1">
-                    <a:latin typeface="Arial"/>
-                  </a:endParaRPr>
-                </a:p>
-              </p:txBody>
-            </p:sp>
-            <p:sp>
-              <p:nvSpPr>
-                <p:cNvPr id="170" name="CustomShape 201">
-                  <a:extLst>
-                    <a:ext uri="{FF2B5EF4-FFF2-40B4-BE49-F238E27FC236}">
-                      <a16:creationId xmlns:a16="http://schemas.microsoft.com/office/drawing/2014/main" id="{D46F4383-0904-4F83-9529-BDD9D9E438C5}"/>
-                    </a:ext>
-                  </a:extLst>
-                </p:cNvPr>
-                <p:cNvSpPr/>
-                <p:nvPr/>
-              </p:nvSpPr>
-              <p:spPr>
-                <a:xfrm rot="10800000" flipV="1">
-                  <a:off x="8009280" y="1420560"/>
-                  <a:ext cx="363240" cy="1800"/>
-                </a:xfrm>
-                <a:prstGeom prst="bentConnector3">
-                  <a:avLst>
-                    <a:gd name="adj1" fmla="val 50000"/>
-                  </a:avLst>
-                </a:prstGeom>
-                <a:noFill/>
-                <a:ln>
-                  <a:solidFill>
-                    <a:srgbClr val="4472C4"/>
-                  </a:solidFill>
-                  <a:tailEnd type="triangle" w="med" len="med"/>
-                </a:ln>
-              </p:spPr>
-              <p:style>
-                <a:lnRef idx="1">
-                  <a:schemeClr val="accent1"/>
-                </a:lnRef>
-                <a:fillRef idx="0">
-                  <a:schemeClr val="accent1"/>
-                </a:fillRef>
-                <a:effectRef idx="0">
-                  <a:schemeClr val="accent1"/>
-                </a:effectRef>
-                <a:fontRef idx="minor"/>
-              </p:style>
-            </p:sp>
-          </p:grpSp>
-          <p:sp>
-            <p:nvSpPr>
-              <p:cNvPr id="162" name="CustomShape 202">
-                <a:extLst>
-                  <a:ext uri="{FF2B5EF4-FFF2-40B4-BE49-F238E27FC236}">
-                    <a16:creationId xmlns:a16="http://schemas.microsoft.com/office/drawing/2014/main" id="{83DB827D-D126-4347-B30B-4C6F612CDAB4}"/>
-                  </a:ext>
-                </a:extLst>
-              </p:cNvPr>
-              <p:cNvSpPr/>
-              <p:nvPr/>
-            </p:nvSpPr>
-            <p:spPr>
-              <a:xfrm>
-                <a:off x="8728560" y="819000"/>
-                <a:ext cx="924525" cy="275545"/>
-              </a:xfrm>
-              <a:prstGeom prst="rect">
-                <a:avLst/>
-              </a:prstGeom>
-              <a:noFill/>
-              <a:ln w="0">
-                <a:noFill/>
-              </a:ln>
-            </p:spPr>
-            <p:style>
-              <a:lnRef idx="0">
-                <a:scrgbClr r="0" g="0" b="0"/>
-              </a:lnRef>
-              <a:fillRef idx="0">
-                <a:scrgbClr r="0" g="0" b="0"/>
-              </a:fillRef>
-              <a:effectRef idx="0">
-                <a:scrgbClr r="0" g="0" b="0"/>
-              </a:effectRef>
-              <a:fontRef idx="minor"/>
-            </p:style>
-            <p:txBody>
-              <a:bodyPr wrap="none" lIns="90000" tIns="45000" rIns="90000" bIns="45000">
-                <a:spAutoFit/>
-              </a:bodyPr>
-              <a:lstStyle/>
-              <a:p>
-                <a:pPr>
-                  <a:lnSpc>
-                    <a:spcPct val="100000"/>
-                  </a:lnSpc>
-                </a:pPr>
-                <a:r>
-                  <a:rPr lang="en-US" sz="1200" b="0" strike="noStrike" spc="-1" dirty="0" err="1">
-                    <a:solidFill>
-                      <a:srgbClr val="000000"/>
-                    </a:solidFill>
-                    <a:latin typeface="Courier New"/>
-                  </a:rPr>
-                  <a:t>core.mat</a:t>
-                </a:r>
-                <a:endParaRPr lang="en-US" sz="1200" b="0" strike="noStrike" spc="-1" dirty="0">
-                  <a:latin typeface="Arial"/>
-                </a:endParaRPr>
-              </a:p>
-            </p:txBody>
-          </p:sp>
-          <p:sp>
-            <p:nvSpPr>
-              <p:cNvPr id="163" name="CustomShape 203">
-                <a:extLst>
-                  <a:ext uri="{FF2B5EF4-FFF2-40B4-BE49-F238E27FC236}">
-                    <a16:creationId xmlns:a16="http://schemas.microsoft.com/office/drawing/2014/main" id="{B0CEE8C2-40D4-480B-859D-F77B186853C3}"/>
-                  </a:ext>
-                </a:extLst>
-              </p:cNvPr>
-              <p:cNvSpPr/>
-              <p:nvPr/>
-            </p:nvSpPr>
-            <p:spPr>
-              <a:xfrm>
-                <a:off x="9918360" y="863640"/>
-                <a:ext cx="1113120" cy="182520"/>
-              </a:xfrm>
-              <a:prstGeom prst="rect">
-                <a:avLst/>
-              </a:prstGeom>
-              <a:solidFill>
-                <a:srgbClr val="ED7D31"/>
-              </a:solidFill>
-              <a:ln>
-                <a:solidFill>
-                  <a:srgbClr val="AF5C24"/>
-                </a:solidFill>
-              </a:ln>
-            </p:spPr>
-            <p:style>
-              <a:lnRef idx="2">
-                <a:schemeClr val="accent2">
-                  <a:shade val="50000"/>
-                </a:schemeClr>
-              </a:lnRef>
-              <a:fillRef idx="1">
-                <a:schemeClr val="accent2"/>
-              </a:fillRef>
-              <a:effectRef idx="0">
-                <a:schemeClr val="accent2"/>
-              </a:effectRef>
-              <a:fontRef idx="minor"/>
-            </p:style>
-            <p:txBody>
-              <a:bodyPr lIns="90000" tIns="45000" rIns="90000" bIns="45000" anchor="ctr">
-                <a:noAutofit/>
-              </a:bodyPr>
-              <a:lstStyle/>
-              <a:p>
-                <a:pPr algn="ctr">
-                  <a:lnSpc>
-                    <a:spcPct val="100000"/>
-                  </a:lnSpc>
-                </a:pPr>
-                <a:r>
-                  <a:rPr lang="en-US" sz="1200" b="0" strike="noStrike" spc="-1">
-                    <a:solidFill>
-                      <a:srgbClr val="FFFFFF"/>
-                    </a:solidFill>
-                    <a:latin typeface="Calibri"/>
-                  </a:rPr>
-                  <a:t>VariantMatrix</a:t>
-                </a:r>
-                <a:endParaRPr lang="en-US" sz="1200" b="0" strike="noStrike" spc="-1">
-                  <a:latin typeface="Arial"/>
-                </a:endParaRPr>
-              </a:p>
-            </p:txBody>
-          </p:sp>
-          <p:sp>
-            <p:nvSpPr>
-              <p:cNvPr id="164" name="CustomShape 204">
-                <a:extLst>
-                  <a:ext uri="{FF2B5EF4-FFF2-40B4-BE49-F238E27FC236}">
-                    <a16:creationId xmlns:a16="http://schemas.microsoft.com/office/drawing/2014/main" id="{AE5D2323-B71E-4EB0-A7D3-7014CFEE07DF}"/>
-                  </a:ext>
-                </a:extLst>
-              </p:cNvPr>
-              <p:cNvSpPr/>
-              <p:nvPr/>
-            </p:nvSpPr>
-            <p:spPr>
-              <a:xfrm>
-                <a:off x="9918360" y="1738080"/>
-                <a:ext cx="1113120" cy="182520"/>
-              </a:xfrm>
-              <a:prstGeom prst="rect">
-                <a:avLst/>
-              </a:prstGeom>
-              <a:solidFill>
-                <a:srgbClr val="ED7D31"/>
-              </a:solidFill>
-              <a:ln>
-                <a:solidFill>
-                  <a:srgbClr val="AF5C24"/>
-                </a:solidFill>
-              </a:ln>
-            </p:spPr>
-            <p:style>
-              <a:lnRef idx="2">
-                <a:schemeClr val="accent2">
-                  <a:shade val="50000"/>
-                </a:schemeClr>
-              </a:lnRef>
-              <a:fillRef idx="1">
-                <a:schemeClr val="accent2"/>
-              </a:fillRef>
-              <a:effectRef idx="0">
-                <a:schemeClr val="accent2"/>
-              </a:effectRef>
-              <a:fontRef idx="minor"/>
-            </p:style>
-            <p:txBody>
-              <a:bodyPr lIns="90000" tIns="45000" rIns="90000" bIns="45000" anchor="ctr">
-                <a:noAutofit/>
-              </a:bodyPr>
-              <a:lstStyle/>
-              <a:p>
-                <a:pPr algn="ctr">
-                  <a:lnSpc>
-                    <a:spcPct val="100000"/>
-                  </a:lnSpc>
-                </a:pPr>
-                <a:r>
-                  <a:rPr lang="en-US" sz="1200" b="0" strike="noStrike" spc="-1">
-                    <a:solidFill>
-                      <a:srgbClr val="FFFFFF"/>
-                    </a:solidFill>
-                    <a:latin typeface="Calibri"/>
-                  </a:rPr>
-                  <a:t>TaxaMatrix</a:t>
-                </a:r>
-                <a:endParaRPr lang="en-US" sz="1200" b="0" strike="noStrike" spc="-1">
-                  <a:latin typeface="Arial"/>
-                </a:endParaRPr>
-              </a:p>
-            </p:txBody>
-          </p:sp>
-          <p:sp>
-            <p:nvSpPr>
-              <p:cNvPr id="165" name="CustomShape 205">
-                <a:extLst>
-                  <a:ext uri="{FF2B5EF4-FFF2-40B4-BE49-F238E27FC236}">
-                    <a16:creationId xmlns:a16="http://schemas.microsoft.com/office/drawing/2014/main" id="{2B9990E1-DB72-4305-8959-429A51CA476F}"/>
-                  </a:ext>
-                </a:extLst>
-              </p:cNvPr>
-              <p:cNvSpPr/>
-              <p:nvPr/>
-            </p:nvSpPr>
-            <p:spPr>
-              <a:xfrm rot="5400000">
-                <a:off x="10334880" y="1185840"/>
-                <a:ext cx="279360" cy="360"/>
-              </a:xfrm>
-              <a:prstGeom prst="bentConnector3">
-                <a:avLst>
-                  <a:gd name="adj1" fmla="val 50000"/>
-                </a:avLst>
-              </a:prstGeom>
-              <a:noFill/>
-              <a:ln>
-                <a:solidFill>
-                  <a:srgbClr val="4472C4"/>
-                </a:solidFill>
-                <a:tailEnd type="triangle" w="med" len="med"/>
-              </a:ln>
-            </p:spPr>
-            <p:style>
-              <a:lnRef idx="1">
-                <a:schemeClr val="accent1"/>
-              </a:lnRef>
-              <a:fillRef idx="0">
-                <a:schemeClr val="accent1"/>
-              </a:fillRef>
-              <a:effectRef idx="0">
-                <a:schemeClr val="accent1"/>
-              </a:effectRef>
-              <a:fontRef idx="minor"/>
-            </p:style>
-          </p:sp>
-          <p:sp>
-            <p:nvSpPr>
-              <p:cNvPr id="166" name="CustomShape 206">
-                <a:extLst>
-                  <a:ext uri="{FF2B5EF4-FFF2-40B4-BE49-F238E27FC236}">
-                    <a16:creationId xmlns:a16="http://schemas.microsoft.com/office/drawing/2014/main" id="{5CCD369F-A92F-43D7-9C2A-36D73CF92FA0}"/>
-                  </a:ext>
-                </a:extLst>
-              </p:cNvPr>
-              <p:cNvSpPr/>
-              <p:nvPr/>
-            </p:nvSpPr>
-            <p:spPr>
-              <a:xfrm rot="16200000" flipV="1">
-                <a:off x="10360440" y="1622520"/>
-                <a:ext cx="228600" cy="360"/>
-              </a:xfrm>
-              <a:prstGeom prst="bentConnector3">
-                <a:avLst>
-                  <a:gd name="adj1" fmla="val 50000"/>
-                </a:avLst>
-              </a:prstGeom>
-              <a:noFill/>
-              <a:ln>
-                <a:solidFill>
-                  <a:srgbClr val="4472C4"/>
-                </a:solidFill>
-                <a:tailEnd type="triangle" w="med" len="med"/>
-              </a:ln>
-            </p:spPr>
-            <p:style>
-              <a:lnRef idx="1">
-                <a:schemeClr val="accent1"/>
-              </a:lnRef>
-              <a:fillRef idx="0">
-                <a:schemeClr val="accent1"/>
-              </a:fillRef>
-              <a:effectRef idx="0">
-                <a:schemeClr val="accent1"/>
-              </a:effectRef>
-              <a:fontRef idx="minor"/>
-            </p:style>
-          </p:sp>
-        </p:grpSp>
-        <p:sp>
-          <p:nvSpPr>
-            <p:cNvPr id="159" name="CustomShape 207">
-              <a:extLst>
-                <a:ext uri="{FF2B5EF4-FFF2-40B4-BE49-F238E27FC236}">
-                  <a16:creationId xmlns:a16="http://schemas.microsoft.com/office/drawing/2014/main" id="{216DD40C-1B60-47E7-B3A3-0F5A27709C1D}"/>
-                </a:ext>
-              </a:extLst>
-            </p:cNvPr>
-            <p:cNvSpPr/>
-            <p:nvPr/>
-          </p:nvSpPr>
-          <p:spPr>
-            <a:xfrm>
-              <a:off x="9849960" y="1326240"/>
-              <a:ext cx="1248120" cy="182520"/>
-            </a:xfrm>
-            <a:prstGeom prst="rect">
-              <a:avLst/>
-            </a:prstGeom>
-            <a:solidFill>
-              <a:srgbClr val="ED7D31"/>
-            </a:solidFill>
-            <a:ln>
-              <a:solidFill>
-                <a:srgbClr val="AF5C24"/>
-              </a:solidFill>
-            </a:ln>
-          </p:spPr>
-          <p:style>
-            <a:lnRef idx="2">
-              <a:schemeClr val="accent2">
-                <a:shade val="50000"/>
-              </a:schemeClr>
-            </a:lnRef>
-            <a:fillRef idx="1">
-              <a:schemeClr val="accent2"/>
-            </a:fillRef>
-            <a:effectRef idx="0">
-              <a:schemeClr val="accent2"/>
-            </a:effectRef>
-            <a:fontRef idx="minor"/>
-          </p:style>
-          <p:txBody>
-            <a:bodyPr lIns="90000" tIns="45000" rIns="90000" bIns="45000" anchor="ctr">
-              <a:noAutofit/>
-            </a:bodyPr>
-            <a:lstStyle/>
-            <a:p>
-              <a:pPr algn="ctr">
-                <a:lnSpc>
-                  <a:spcPct val="100000"/>
-                </a:lnSpc>
-              </a:pPr>
-              <a:r>
-                <a:rPr lang="en-US" sz="1200" b="0" strike="noStrike" spc="-1">
-                  <a:solidFill>
-                    <a:srgbClr val="FFFFFF"/>
-                  </a:solidFill>
-                  <a:latin typeface="Calibri"/>
-                </a:rPr>
-                <a:t>GroupableMatrix</a:t>
-              </a:r>
-              <a:endParaRPr lang="en-US" sz="1200" b="0" strike="noStrike" spc="-1">
-                <a:latin typeface="Arial"/>
-              </a:endParaRPr>
-            </a:p>
-          </p:txBody>
-        </p:sp>
-        <p:sp>
-          <p:nvSpPr>
-            <p:cNvPr id="160" name="CustomShape 208">
-              <a:extLst>
-                <a:ext uri="{FF2B5EF4-FFF2-40B4-BE49-F238E27FC236}">
-                  <a16:creationId xmlns:a16="http://schemas.microsoft.com/office/drawing/2014/main" id="{FD74C81E-B0CD-4018-9749-F06191A48A05}"/>
-                </a:ext>
-              </a:extLst>
-            </p:cNvPr>
-            <p:cNvSpPr/>
-            <p:nvPr/>
-          </p:nvSpPr>
-          <p:spPr>
-            <a:xfrm flipH="1">
-              <a:off x="9484920" y="1417680"/>
-              <a:ext cx="363960" cy="2520"/>
-            </a:xfrm>
-            <a:custGeom>
-              <a:avLst/>
-              <a:gdLst/>
-              <a:ahLst/>
-              <a:cxnLst/>
-              <a:rect l="l" t="t" r="r" b="b"/>
-              <a:pathLst>
-                <a:path w="21600" h="21600">
-                  <a:moveTo>
-                    <a:pt x="0" y="0"/>
-                  </a:moveTo>
-                  <a:lnTo>
-                    <a:pt x="21600" y="21600"/>
-                  </a:lnTo>
-                </a:path>
-              </a:pathLst>
-            </a:custGeom>
-            <a:noFill/>
-            <a:ln>
-              <a:solidFill>
-                <a:srgbClr val="4472C4"/>
-              </a:solidFill>
-              <a:tailEnd type="triangle" w="med" len="med"/>
-            </a:ln>
-          </p:spPr>
-          <p:style>
-            <a:lnRef idx="1">
-              <a:schemeClr val="accent1"/>
-            </a:lnRef>
-            <a:fillRef idx="0">
-              <a:schemeClr val="accent1"/>
-            </a:fillRef>
-            <a:effectRef idx="0">
-              <a:schemeClr val="accent1"/>
-            </a:effectRef>
-            <a:fontRef idx="minor"/>
-          </p:style>
-        </p:sp>
-      </p:grpSp>
       <p:sp>
         <p:nvSpPr>
           <p:cNvPr id="171" name="CustomShape 210">
@@ -11401,7 +10704,7 @@
         </p:nvSpPr>
         <p:spPr>
           <a:xfrm>
-            <a:off x="11694878" y="349200"/>
+            <a:off x="11696551" y="157171"/>
             <a:ext cx="873742" cy="437128"/>
           </a:xfrm>
           <a:prstGeom prst="rect">
@@ -18503,8 +17806,8 @@
         </p:nvCxnSpPr>
         <p:spPr>
           <a:xfrm rot="5400000" flipH="1" flipV="1">
-            <a:off x="11182627" y="2370694"/>
-            <a:ext cx="360211" cy="745"/>
+            <a:off x="11773925" y="1779396"/>
+            <a:ext cx="360211" cy="1183340"/>
           </a:xfrm>
           <a:prstGeom prst="bentConnector3">
             <a:avLst/>
@@ -21045,6 +20348,7 @@
             </a:extLst>
           </p:cNvPr>
           <p:cNvCxnSpPr>
+            <a:cxnSpLocks/>
             <a:stCxn id="6" idx="3"/>
             <a:endCxn id="4" idx="3"/>
           </p:cNvCxnSpPr>
@@ -21052,12 +20356,12 @@
         </p:nvCxnSpPr>
         <p:spPr>
           <a:xfrm flipH="1" flipV="1">
-            <a:off x="14242599" y="1259100"/>
-            <a:ext cx="7059541" cy="17329596"/>
+            <a:off x="16607789" y="1175326"/>
+            <a:ext cx="4694351" cy="17413370"/>
           </a:xfrm>
           <a:prstGeom prst="bentConnector3">
             <a:avLst>
-              <a:gd name="adj1" fmla="val -3238"/>
+              <a:gd name="adj1" fmla="val -4870"/>
             </a:avLst>
           </a:prstGeom>
           <a:ln w="12700">
@@ -25640,6 +24944,1295 @@
           </p:style>
         </p:cxnSp>
       </p:grpSp>
+      <p:grpSp>
+        <p:nvGrpSpPr>
+          <p:cNvPr id="497" name="Group 496">
+            <a:extLst>
+              <a:ext uri="{FF2B5EF4-FFF2-40B4-BE49-F238E27FC236}">
+                <a16:creationId xmlns:a16="http://schemas.microsoft.com/office/drawing/2014/main" id="{B2B70AEA-51CB-4E1E-82B4-DF4DDBA783ED}"/>
+              </a:ext>
+            </a:extLst>
+          </p:cNvPr>
+          <p:cNvGrpSpPr/>
+          <p:nvPr/>
+        </p:nvGrpSpPr>
+        <p:grpSpPr>
+          <a:xfrm>
+            <a:off x="10209377" y="583985"/>
+            <a:ext cx="6168172" cy="1403575"/>
+            <a:chOff x="9582181" y="599105"/>
+            <a:chExt cx="6168172" cy="1403575"/>
+          </a:xfrm>
+        </p:grpSpPr>
+        <p:grpSp>
+          <p:nvGrpSpPr>
+            <p:cNvPr id="157" name="Group 195">
+              <a:extLst>
+                <a:ext uri="{FF2B5EF4-FFF2-40B4-BE49-F238E27FC236}">
+                  <a16:creationId xmlns:a16="http://schemas.microsoft.com/office/drawing/2014/main" id="{965B2282-9036-4D1E-AB90-918DD3F330C0}"/>
+                </a:ext>
+              </a:extLst>
+            </p:cNvPr>
+            <p:cNvGrpSpPr/>
+            <p:nvPr/>
+          </p:nvGrpSpPr>
+          <p:grpSpPr>
+            <a:xfrm>
+              <a:off x="9582181" y="599105"/>
+              <a:ext cx="6168172" cy="1403575"/>
+              <a:chOff x="6728903" y="599105"/>
+              <a:chExt cx="6168172" cy="1403575"/>
+            </a:xfrm>
+          </p:grpSpPr>
+          <p:grpSp>
+            <p:nvGrpSpPr>
+              <p:cNvPr id="158" name="Group 196">
+                <a:extLst>
+                  <a:ext uri="{FF2B5EF4-FFF2-40B4-BE49-F238E27FC236}">
+                    <a16:creationId xmlns:a16="http://schemas.microsoft.com/office/drawing/2014/main" id="{91029BE8-5293-4CF4-900F-48BD42A3071B}"/>
+                  </a:ext>
+                </a:extLst>
+              </p:cNvPr>
+              <p:cNvGrpSpPr/>
+              <p:nvPr/>
+            </p:nvGrpSpPr>
+            <p:grpSpPr>
+              <a:xfrm>
+                <a:off x="6728903" y="599105"/>
+                <a:ext cx="6168172" cy="1403575"/>
+                <a:chOff x="6728903" y="599105"/>
+                <a:chExt cx="6168172" cy="1403575"/>
+              </a:xfrm>
+            </p:grpSpPr>
+            <p:grpSp>
+              <p:nvGrpSpPr>
+                <p:cNvPr id="161" name="Group 197">
+                  <a:extLst>
+                    <a:ext uri="{FF2B5EF4-FFF2-40B4-BE49-F238E27FC236}">
+                      <a16:creationId xmlns:a16="http://schemas.microsoft.com/office/drawing/2014/main" id="{AD7CB44A-776B-4979-8111-75733A186401}"/>
+                    </a:ext>
+                  </a:extLst>
+                </p:cNvPr>
+                <p:cNvGrpSpPr/>
+                <p:nvPr/>
+              </p:nvGrpSpPr>
+              <p:grpSpPr>
+                <a:xfrm>
+                  <a:off x="6728903" y="603211"/>
+                  <a:ext cx="6168172" cy="1399469"/>
+                  <a:chOff x="6728903" y="603211"/>
+                  <a:chExt cx="6168172" cy="1399469"/>
+                </a:xfrm>
+              </p:grpSpPr>
+              <p:sp>
+                <p:nvSpPr>
+                  <p:cNvPr id="167" name="CustomShape 198">
+                    <a:extLst>
+                      <a:ext uri="{FF2B5EF4-FFF2-40B4-BE49-F238E27FC236}">
+                        <a16:creationId xmlns:a16="http://schemas.microsoft.com/office/drawing/2014/main" id="{3945F0D2-A466-4348-AAB7-A051F161EBA4}"/>
+                      </a:ext>
+                    </a:extLst>
+                  </p:cNvPr>
+                  <p:cNvSpPr/>
+                  <p:nvPr/>
+                </p:nvSpPr>
+                <p:spPr>
+                  <a:xfrm>
+                    <a:off x="6728903" y="603211"/>
+                    <a:ext cx="6168172" cy="1399469"/>
+                  </a:xfrm>
+                  <a:prstGeom prst="rect">
+                    <a:avLst/>
+                  </a:prstGeom>
+                  <a:solidFill>
+                    <a:schemeClr val="accent6">
+                      <a:alpha val="50000"/>
+                    </a:schemeClr>
+                  </a:solidFill>
+                  <a:ln w="0">
+                    <a:noFill/>
+                  </a:ln>
+                </p:spPr>
+                <p:style>
+                  <a:lnRef idx="0">
+                    <a:scrgbClr r="0" g="0" b="0"/>
+                  </a:lnRef>
+                  <a:fillRef idx="0">
+                    <a:scrgbClr r="0" g="0" b="0"/>
+                  </a:fillRef>
+                  <a:effectRef idx="0">
+                    <a:scrgbClr r="0" g="0" b="0"/>
+                  </a:effectRef>
+                  <a:fontRef idx="minor"/>
+                </p:style>
+              </p:sp>
+              <p:sp>
+                <p:nvSpPr>
+                  <p:cNvPr id="168" name="CustomShape 199">
+                    <a:extLst>
+                      <a:ext uri="{FF2B5EF4-FFF2-40B4-BE49-F238E27FC236}">
+                        <a16:creationId xmlns:a16="http://schemas.microsoft.com/office/drawing/2014/main" id="{141890E6-23CF-4642-A4D9-B5C28134A114}"/>
+                      </a:ext>
+                    </a:extLst>
+                  </p:cNvPr>
+                  <p:cNvSpPr/>
+                  <p:nvPr/>
+                </p:nvSpPr>
+                <p:spPr>
+                  <a:xfrm>
+                    <a:off x="9912395" y="1329480"/>
+                    <a:ext cx="1113120" cy="182520"/>
+                  </a:xfrm>
+                  <a:prstGeom prst="rect">
+                    <a:avLst/>
+                  </a:prstGeom>
+                  <a:solidFill>
+                    <a:srgbClr val="ED7D31"/>
+                  </a:solidFill>
+                  <a:ln>
+                    <a:solidFill>
+                      <a:srgbClr val="AF5C24"/>
+                    </a:solidFill>
+                  </a:ln>
+                </p:spPr>
+                <p:style>
+                  <a:lnRef idx="2">
+                    <a:schemeClr val="accent2">
+                      <a:shade val="50000"/>
+                    </a:schemeClr>
+                  </a:lnRef>
+                  <a:fillRef idx="1">
+                    <a:schemeClr val="accent2"/>
+                  </a:fillRef>
+                  <a:effectRef idx="0">
+                    <a:schemeClr val="accent2"/>
+                  </a:effectRef>
+                  <a:fontRef idx="minor"/>
+                </p:style>
+                <p:txBody>
+                  <a:bodyPr lIns="90000" tIns="45000" rIns="90000" bIns="45000" anchor="ctr">
+                    <a:noAutofit/>
+                  </a:bodyPr>
+                  <a:lstStyle/>
+                  <a:p>
+                    <a:pPr algn="ctr">
+                      <a:lnSpc>
+                        <a:spcPct val="100000"/>
+                      </a:lnSpc>
+                    </a:pPr>
+                    <a:r>
+                      <a:rPr lang="en-US" sz="1200" b="0" strike="noStrike" spc="-1" dirty="0" err="1">
+                        <a:solidFill>
+                          <a:srgbClr val="FFFFFF"/>
+                        </a:solidFill>
+                        <a:latin typeface="Calibri"/>
+                      </a:rPr>
+                      <a:t>SortableMatrix</a:t>
+                    </a:r>
+                    <a:endParaRPr lang="en-US" sz="1200" b="0" strike="noStrike" spc="-1" dirty="0">
+                      <a:latin typeface="Arial"/>
+                    </a:endParaRPr>
+                  </a:p>
+                </p:txBody>
+              </p:sp>
+              <p:sp>
+                <p:nvSpPr>
+                  <p:cNvPr id="169" name="CustomShape 200">
+                    <a:extLst>
+                      <a:ext uri="{FF2B5EF4-FFF2-40B4-BE49-F238E27FC236}">
+                        <a16:creationId xmlns:a16="http://schemas.microsoft.com/office/drawing/2014/main" id="{9EC95AB6-0C95-4652-8E99-5E1BD7CB7FB1}"/>
+                      </a:ext>
+                    </a:extLst>
+                  </p:cNvPr>
+                  <p:cNvSpPr/>
+                  <p:nvPr/>
+                </p:nvSpPr>
+                <p:spPr>
+                  <a:xfrm>
+                    <a:off x="7066983" y="1328489"/>
+                    <a:ext cx="630000" cy="182520"/>
+                  </a:xfrm>
+                  <a:prstGeom prst="rect">
+                    <a:avLst/>
+                  </a:prstGeom>
+                  <a:solidFill>
+                    <a:srgbClr val="ED7D31"/>
+                  </a:solidFill>
+                  <a:ln>
+                    <a:solidFill>
+                      <a:srgbClr val="AF5C24"/>
+                    </a:solidFill>
+                  </a:ln>
+                </p:spPr>
+                <p:style>
+                  <a:lnRef idx="2">
+                    <a:schemeClr val="accent2">
+                      <a:shade val="50000"/>
+                    </a:schemeClr>
+                  </a:lnRef>
+                  <a:fillRef idx="1">
+                    <a:schemeClr val="accent2"/>
+                  </a:fillRef>
+                  <a:effectRef idx="0">
+                    <a:schemeClr val="accent2"/>
+                  </a:effectRef>
+                  <a:fontRef idx="minor"/>
+                </p:style>
+                <p:txBody>
+                  <a:bodyPr lIns="90000" tIns="45000" rIns="90000" bIns="45000" anchor="ctr">
+                    <a:noAutofit/>
+                  </a:bodyPr>
+                  <a:lstStyle/>
+                  <a:p>
+                    <a:pPr algn="ctr">
+                      <a:lnSpc>
+                        <a:spcPct val="100000"/>
+                      </a:lnSpc>
+                    </a:pPr>
+                    <a:r>
+                      <a:rPr lang="en-US" sz="1200" b="0" strike="noStrike" spc="-1" dirty="0">
+                        <a:solidFill>
+                          <a:srgbClr val="FFFFFF"/>
+                        </a:solidFill>
+                        <a:latin typeface="Calibri"/>
+                      </a:rPr>
+                      <a:t>Matrix</a:t>
+                    </a:r>
+                    <a:endParaRPr lang="en-US" sz="1200" b="0" strike="noStrike" spc="-1" dirty="0">
+                      <a:latin typeface="Arial"/>
+                    </a:endParaRPr>
+                  </a:p>
+                </p:txBody>
+              </p:sp>
+            </p:grpSp>
+            <p:sp>
+              <p:nvSpPr>
+                <p:cNvPr id="162" name="CustomShape 202">
+                  <a:extLst>
+                    <a:ext uri="{FF2B5EF4-FFF2-40B4-BE49-F238E27FC236}">
+                      <a16:creationId xmlns:a16="http://schemas.microsoft.com/office/drawing/2014/main" id="{83DB827D-D126-4347-B30B-4C6F612CDAB4}"/>
+                    </a:ext>
+                  </a:extLst>
+                </p:cNvPr>
+                <p:cNvSpPr/>
+                <p:nvPr/>
+              </p:nvSpPr>
+              <p:spPr>
+                <a:xfrm>
+                  <a:off x="10008083" y="599105"/>
+                  <a:ext cx="924525" cy="275545"/>
+                </a:xfrm>
+                <a:prstGeom prst="rect">
+                  <a:avLst/>
+                </a:prstGeom>
+                <a:noFill/>
+                <a:ln w="0">
+                  <a:noFill/>
+                </a:ln>
+              </p:spPr>
+              <p:style>
+                <a:lnRef idx="0">
+                  <a:scrgbClr r="0" g="0" b="0"/>
+                </a:lnRef>
+                <a:fillRef idx="0">
+                  <a:scrgbClr r="0" g="0" b="0"/>
+                </a:fillRef>
+                <a:effectRef idx="0">
+                  <a:scrgbClr r="0" g="0" b="0"/>
+                </a:effectRef>
+                <a:fontRef idx="minor"/>
+              </p:style>
+              <p:txBody>
+                <a:bodyPr wrap="none" lIns="90000" tIns="45000" rIns="90000" bIns="45000">
+                  <a:spAutoFit/>
+                </a:bodyPr>
+                <a:lstStyle/>
+                <a:p>
+                  <a:pPr>
+                    <a:lnSpc>
+                      <a:spcPct val="100000"/>
+                    </a:lnSpc>
+                  </a:pPr>
+                  <a:r>
+                    <a:rPr lang="en-US" sz="1200" b="0" strike="noStrike" spc="-1" dirty="0" err="1">
+                      <a:solidFill>
+                        <a:srgbClr val="000000"/>
+                      </a:solidFill>
+                      <a:latin typeface="Courier New"/>
+                    </a:rPr>
+                    <a:t>core.mat</a:t>
+                  </a:r>
+                  <a:endParaRPr lang="en-US" sz="1200" b="0" strike="noStrike" spc="-1" dirty="0">
+                    <a:latin typeface="Arial"/>
+                  </a:endParaRPr>
+                </a:p>
+              </p:txBody>
+            </p:sp>
+            <p:sp>
+              <p:nvSpPr>
+                <p:cNvPr id="163" name="CustomShape 203">
+                  <a:extLst>
+                    <a:ext uri="{FF2B5EF4-FFF2-40B4-BE49-F238E27FC236}">
+                      <a16:creationId xmlns:a16="http://schemas.microsoft.com/office/drawing/2014/main" id="{B0CEE8C2-40D4-480B-859D-F77B186853C3}"/>
+                    </a:ext>
+                  </a:extLst>
+                </p:cNvPr>
+                <p:cNvSpPr/>
+                <p:nvPr/>
+              </p:nvSpPr>
+              <p:spPr>
+                <a:xfrm>
+                  <a:off x="11461410" y="863640"/>
+                  <a:ext cx="1113120" cy="182520"/>
+                </a:xfrm>
+                <a:prstGeom prst="rect">
+                  <a:avLst/>
+                </a:prstGeom>
+                <a:solidFill>
+                  <a:srgbClr val="ED7D31"/>
+                </a:solidFill>
+                <a:ln>
+                  <a:solidFill>
+                    <a:srgbClr val="AF5C24"/>
+                  </a:solidFill>
+                </a:ln>
+              </p:spPr>
+              <p:style>
+                <a:lnRef idx="2">
+                  <a:schemeClr val="accent2">
+                    <a:shade val="50000"/>
+                  </a:schemeClr>
+                </a:lnRef>
+                <a:fillRef idx="1">
+                  <a:schemeClr val="accent2"/>
+                </a:fillRef>
+                <a:effectRef idx="0">
+                  <a:schemeClr val="accent2"/>
+                </a:effectRef>
+                <a:fontRef idx="minor"/>
+              </p:style>
+              <p:txBody>
+                <a:bodyPr lIns="90000" tIns="45000" rIns="90000" bIns="45000" anchor="ctr">
+                  <a:noAutofit/>
+                </a:bodyPr>
+                <a:lstStyle/>
+                <a:p>
+                  <a:pPr algn="ctr">
+                    <a:lnSpc>
+                      <a:spcPct val="100000"/>
+                    </a:lnSpc>
+                  </a:pPr>
+                  <a:r>
+                    <a:rPr lang="en-US" sz="1200" b="0" strike="noStrike" spc="-1" dirty="0" err="1">
+                      <a:solidFill>
+                        <a:srgbClr val="FFFFFF"/>
+                      </a:solidFill>
+                      <a:latin typeface="Calibri"/>
+                    </a:rPr>
+                    <a:t>VariantMatrix</a:t>
+                  </a:r>
+                  <a:endParaRPr lang="en-US" sz="1200" b="0" strike="noStrike" spc="-1" dirty="0">
+                    <a:latin typeface="Arial"/>
+                  </a:endParaRPr>
+                </a:p>
+              </p:txBody>
+            </p:sp>
+            <p:sp>
+              <p:nvSpPr>
+                <p:cNvPr id="164" name="CustomShape 204">
+                  <a:extLst>
+                    <a:ext uri="{FF2B5EF4-FFF2-40B4-BE49-F238E27FC236}">
+                      <a16:creationId xmlns:a16="http://schemas.microsoft.com/office/drawing/2014/main" id="{AE5D2323-B71E-4EB0-A7D3-7014CFEE07DF}"/>
+                    </a:ext>
+                  </a:extLst>
+                </p:cNvPr>
+                <p:cNvSpPr/>
+                <p:nvPr/>
+              </p:nvSpPr>
+              <p:spPr>
+                <a:xfrm>
+                  <a:off x="11461410" y="1738080"/>
+                  <a:ext cx="1113120" cy="182520"/>
+                </a:xfrm>
+                <a:prstGeom prst="rect">
+                  <a:avLst/>
+                </a:prstGeom>
+                <a:solidFill>
+                  <a:srgbClr val="ED7D31"/>
+                </a:solidFill>
+                <a:ln>
+                  <a:solidFill>
+                    <a:srgbClr val="AF5C24"/>
+                  </a:solidFill>
+                </a:ln>
+              </p:spPr>
+              <p:style>
+                <a:lnRef idx="2">
+                  <a:schemeClr val="accent2">
+                    <a:shade val="50000"/>
+                  </a:schemeClr>
+                </a:lnRef>
+                <a:fillRef idx="1">
+                  <a:schemeClr val="accent2"/>
+                </a:fillRef>
+                <a:effectRef idx="0">
+                  <a:schemeClr val="accent2"/>
+                </a:effectRef>
+                <a:fontRef idx="minor"/>
+              </p:style>
+              <p:txBody>
+                <a:bodyPr lIns="90000" tIns="45000" rIns="90000" bIns="45000" anchor="ctr">
+                  <a:noAutofit/>
+                </a:bodyPr>
+                <a:lstStyle/>
+                <a:p>
+                  <a:pPr algn="ctr">
+                    <a:lnSpc>
+                      <a:spcPct val="100000"/>
+                    </a:lnSpc>
+                  </a:pPr>
+                  <a:r>
+                    <a:rPr lang="en-US" sz="1200" b="0" strike="noStrike" spc="-1" dirty="0" err="1">
+                      <a:solidFill>
+                        <a:srgbClr val="FFFFFF"/>
+                      </a:solidFill>
+                      <a:latin typeface="Calibri"/>
+                    </a:rPr>
+                    <a:t>TaxaMatrix</a:t>
+                  </a:r>
+                  <a:endParaRPr lang="en-US" sz="1200" b="0" strike="noStrike" spc="-1" dirty="0">
+                    <a:latin typeface="Arial"/>
+                  </a:endParaRPr>
+                </a:p>
+              </p:txBody>
+            </p:sp>
+          </p:grpSp>
+          <p:sp>
+            <p:nvSpPr>
+              <p:cNvPr id="159" name="CustomShape 207">
+                <a:extLst>
+                  <a:ext uri="{FF2B5EF4-FFF2-40B4-BE49-F238E27FC236}">
+                    <a16:creationId xmlns:a16="http://schemas.microsoft.com/office/drawing/2014/main" id="{216DD40C-1B60-47E7-B3A3-0F5A27709C1D}"/>
+                  </a:ext>
+                </a:extLst>
+              </p:cNvPr>
+              <p:cNvSpPr/>
+              <p:nvPr/>
+            </p:nvSpPr>
+            <p:spPr>
+              <a:xfrm>
+                <a:off x="11393010" y="1326240"/>
+                <a:ext cx="1248120" cy="182520"/>
+              </a:xfrm>
+              <a:prstGeom prst="rect">
+                <a:avLst/>
+              </a:prstGeom>
+              <a:solidFill>
+                <a:srgbClr val="ED7D31"/>
+              </a:solidFill>
+              <a:ln>
+                <a:solidFill>
+                  <a:srgbClr val="AF5C24"/>
+                </a:solidFill>
+              </a:ln>
+            </p:spPr>
+            <p:style>
+              <a:lnRef idx="2">
+                <a:schemeClr val="accent2">
+                  <a:shade val="50000"/>
+                </a:schemeClr>
+              </a:lnRef>
+              <a:fillRef idx="1">
+                <a:schemeClr val="accent2"/>
+              </a:fillRef>
+              <a:effectRef idx="0">
+                <a:schemeClr val="accent2"/>
+              </a:effectRef>
+              <a:fontRef idx="minor"/>
+            </p:style>
+            <p:txBody>
+              <a:bodyPr lIns="90000" tIns="45000" rIns="90000" bIns="45000" anchor="ctr">
+                <a:noAutofit/>
+              </a:bodyPr>
+              <a:lstStyle/>
+              <a:p>
+                <a:pPr algn="ctr">
+                  <a:lnSpc>
+                    <a:spcPct val="100000"/>
+                  </a:lnSpc>
+                </a:pPr>
+                <a:r>
+                  <a:rPr lang="en-US" sz="1200" b="0" strike="noStrike" spc="-1" dirty="0" err="1">
+                    <a:solidFill>
+                      <a:srgbClr val="FFFFFF"/>
+                    </a:solidFill>
+                    <a:latin typeface="Calibri"/>
+                  </a:rPr>
+                  <a:t>GroupableMatrix</a:t>
+                </a:r>
+                <a:endParaRPr lang="en-US" sz="1200" b="0" strike="noStrike" spc="-1" dirty="0">
+                  <a:latin typeface="Arial"/>
+                </a:endParaRPr>
+              </a:p>
+            </p:txBody>
+          </p:sp>
+        </p:grpSp>
+        <p:cxnSp>
+          <p:nvCxnSpPr>
+            <p:cNvPr id="477" name="Straight Arrow Connector 476">
+              <a:extLst>
+                <a:ext uri="{FF2B5EF4-FFF2-40B4-BE49-F238E27FC236}">
+                  <a16:creationId xmlns:a16="http://schemas.microsoft.com/office/drawing/2014/main" id="{9B5D7CD9-B269-47D6-B892-070473F77281}"/>
+                </a:ext>
+              </a:extLst>
+            </p:cNvPr>
+            <p:cNvCxnSpPr>
+              <a:stCxn id="163" idx="2"/>
+              <a:endCxn id="159" idx="0"/>
+            </p:cNvCxnSpPr>
+            <p:nvPr/>
+          </p:nvCxnSpPr>
+          <p:spPr>
+            <a:xfrm flipH="1">
+              <a:off x="14870348" y="1046160"/>
+              <a:ext cx="900" cy="280080"/>
+            </a:xfrm>
+            <a:prstGeom prst="straightConnector1">
+              <a:avLst/>
+            </a:prstGeom>
+            <a:ln>
+              <a:tailEnd type="triangle"/>
+            </a:ln>
+          </p:spPr>
+          <p:style>
+            <a:lnRef idx="1">
+              <a:schemeClr val="accent1"/>
+            </a:lnRef>
+            <a:fillRef idx="0">
+              <a:schemeClr val="accent1"/>
+            </a:fillRef>
+            <a:effectRef idx="0">
+              <a:schemeClr val="accent1"/>
+            </a:effectRef>
+            <a:fontRef idx="minor">
+              <a:schemeClr val="tx1"/>
+            </a:fontRef>
+          </p:style>
+        </p:cxnSp>
+        <p:cxnSp>
+          <p:nvCxnSpPr>
+            <p:cNvPr id="479" name="Straight Arrow Connector 478">
+              <a:extLst>
+                <a:ext uri="{FF2B5EF4-FFF2-40B4-BE49-F238E27FC236}">
+                  <a16:creationId xmlns:a16="http://schemas.microsoft.com/office/drawing/2014/main" id="{F8236391-FB99-41AC-8CEC-0F3A1CDD400C}"/>
+                </a:ext>
+              </a:extLst>
+            </p:cNvPr>
+            <p:cNvCxnSpPr>
+              <a:stCxn id="164" idx="0"/>
+              <a:endCxn id="159" idx="2"/>
+            </p:cNvCxnSpPr>
+            <p:nvPr/>
+          </p:nvCxnSpPr>
+          <p:spPr>
+            <a:xfrm flipH="1" flipV="1">
+              <a:off x="14870348" y="1508760"/>
+              <a:ext cx="900" cy="229320"/>
+            </a:xfrm>
+            <a:prstGeom prst="straightConnector1">
+              <a:avLst/>
+            </a:prstGeom>
+            <a:ln>
+              <a:tailEnd type="triangle"/>
+            </a:ln>
+          </p:spPr>
+          <p:style>
+            <a:lnRef idx="1">
+              <a:schemeClr val="accent1"/>
+            </a:lnRef>
+            <a:fillRef idx="0">
+              <a:schemeClr val="accent1"/>
+            </a:fillRef>
+            <a:effectRef idx="0">
+              <a:schemeClr val="accent1"/>
+            </a:effectRef>
+            <a:fontRef idx="minor">
+              <a:schemeClr val="tx1"/>
+            </a:fontRef>
+          </p:style>
+        </p:cxnSp>
+        <p:cxnSp>
+          <p:nvCxnSpPr>
+            <p:cNvPr id="481" name="Straight Arrow Connector 480">
+              <a:extLst>
+                <a:ext uri="{FF2B5EF4-FFF2-40B4-BE49-F238E27FC236}">
+                  <a16:creationId xmlns:a16="http://schemas.microsoft.com/office/drawing/2014/main" id="{AF3CC1C4-3D41-4124-9EEC-32E0E544A29C}"/>
+                </a:ext>
+              </a:extLst>
+            </p:cNvPr>
+            <p:cNvCxnSpPr>
+              <a:stCxn id="159" idx="1"/>
+              <a:endCxn id="168" idx="3"/>
+            </p:cNvCxnSpPr>
+            <p:nvPr/>
+          </p:nvCxnSpPr>
+          <p:spPr>
+            <a:xfrm flipH="1">
+              <a:off x="13878793" y="1417500"/>
+              <a:ext cx="367495" cy="3240"/>
+            </a:xfrm>
+            <a:prstGeom prst="straightConnector1">
+              <a:avLst/>
+            </a:prstGeom>
+            <a:ln>
+              <a:tailEnd type="triangle"/>
+            </a:ln>
+          </p:spPr>
+          <p:style>
+            <a:lnRef idx="1">
+              <a:schemeClr val="accent1"/>
+            </a:lnRef>
+            <a:fillRef idx="0">
+              <a:schemeClr val="accent1"/>
+            </a:fillRef>
+            <a:effectRef idx="0">
+              <a:schemeClr val="accent1"/>
+            </a:effectRef>
+            <a:fontRef idx="minor">
+              <a:schemeClr val="tx1"/>
+            </a:fontRef>
+          </p:style>
+        </p:cxnSp>
+        <p:sp>
+          <p:nvSpPr>
+            <p:cNvPr id="482" name="CustomShape 199">
+              <a:extLst>
+                <a:ext uri="{FF2B5EF4-FFF2-40B4-BE49-F238E27FC236}">
+                  <a16:creationId xmlns:a16="http://schemas.microsoft.com/office/drawing/2014/main" id="{7C131850-677C-4C9F-BEFD-9FF32264BE4B}"/>
+                </a:ext>
+              </a:extLst>
+            </p:cNvPr>
+            <p:cNvSpPr/>
+            <p:nvPr/>
+          </p:nvSpPr>
+          <p:spPr>
+            <a:xfrm>
+              <a:off x="11241673" y="1329480"/>
+              <a:ext cx="1113120" cy="182520"/>
+            </a:xfrm>
+            <a:prstGeom prst="rect">
+              <a:avLst/>
+            </a:prstGeom>
+            <a:solidFill>
+              <a:srgbClr val="ED7D31"/>
+            </a:solidFill>
+            <a:ln>
+              <a:solidFill>
+                <a:srgbClr val="AF5C24"/>
+              </a:solidFill>
+            </a:ln>
+          </p:spPr>
+          <p:style>
+            <a:lnRef idx="2">
+              <a:schemeClr val="accent2">
+                <a:shade val="50000"/>
+              </a:schemeClr>
+            </a:lnRef>
+            <a:fillRef idx="1">
+              <a:schemeClr val="accent2"/>
+            </a:fillRef>
+            <a:effectRef idx="0">
+              <a:schemeClr val="accent2"/>
+            </a:effectRef>
+            <a:fontRef idx="minor"/>
+          </p:style>
+          <p:txBody>
+            <a:bodyPr lIns="90000" tIns="45000" rIns="90000" bIns="45000" anchor="ctr">
+              <a:noAutofit/>
+            </a:bodyPr>
+            <a:lstStyle/>
+            <a:p>
+              <a:pPr algn="ctr">
+                <a:lnSpc>
+                  <a:spcPct val="100000"/>
+                </a:lnSpc>
+              </a:pPr>
+              <a:r>
+                <a:rPr lang="en-US" sz="1200" b="0" strike="noStrike" spc="-1" dirty="0" err="1">
+                  <a:solidFill>
+                    <a:srgbClr val="FFFFFF"/>
+                  </a:solidFill>
+                  <a:latin typeface="Calibri"/>
+                </a:rPr>
+                <a:t>MutableMatrix</a:t>
+              </a:r>
+              <a:endParaRPr lang="en-US" sz="1200" b="0" strike="noStrike" spc="-1" dirty="0">
+                <a:latin typeface="Arial"/>
+              </a:endParaRPr>
+            </a:p>
+          </p:txBody>
+        </p:sp>
+        <p:cxnSp>
+          <p:nvCxnSpPr>
+            <p:cNvPr id="484" name="Straight Arrow Connector 483">
+              <a:extLst>
+                <a:ext uri="{FF2B5EF4-FFF2-40B4-BE49-F238E27FC236}">
+                  <a16:creationId xmlns:a16="http://schemas.microsoft.com/office/drawing/2014/main" id="{F7F831D7-BC90-4164-85CA-CAAFD913A954}"/>
+                </a:ext>
+              </a:extLst>
+            </p:cNvPr>
+            <p:cNvCxnSpPr>
+              <a:stCxn id="168" idx="1"/>
+              <a:endCxn id="482" idx="3"/>
+            </p:cNvCxnSpPr>
+            <p:nvPr/>
+          </p:nvCxnSpPr>
+          <p:spPr>
+            <a:xfrm flipH="1">
+              <a:off x="12354793" y="1420740"/>
+              <a:ext cx="410880" cy="0"/>
+            </a:xfrm>
+            <a:prstGeom prst="straightConnector1">
+              <a:avLst/>
+            </a:prstGeom>
+            <a:ln>
+              <a:tailEnd type="triangle"/>
+            </a:ln>
+          </p:spPr>
+          <p:style>
+            <a:lnRef idx="1">
+              <a:schemeClr val="accent1"/>
+            </a:lnRef>
+            <a:fillRef idx="0">
+              <a:schemeClr val="accent1"/>
+            </a:fillRef>
+            <a:effectRef idx="0">
+              <a:schemeClr val="accent1"/>
+            </a:effectRef>
+            <a:fontRef idx="minor">
+              <a:schemeClr val="tx1"/>
+            </a:fontRef>
+          </p:style>
+        </p:cxnSp>
+        <p:cxnSp>
+          <p:nvCxnSpPr>
+            <p:cNvPr id="486" name="Straight Arrow Connector 485">
+              <a:extLst>
+                <a:ext uri="{FF2B5EF4-FFF2-40B4-BE49-F238E27FC236}">
+                  <a16:creationId xmlns:a16="http://schemas.microsoft.com/office/drawing/2014/main" id="{F9106B8D-A0E5-4BC8-AB86-2467496C7E2E}"/>
+                </a:ext>
+              </a:extLst>
+            </p:cNvPr>
+            <p:cNvCxnSpPr>
+              <a:stCxn id="482" idx="1"/>
+              <a:endCxn id="169" idx="3"/>
+            </p:cNvCxnSpPr>
+            <p:nvPr/>
+          </p:nvCxnSpPr>
+          <p:spPr>
+            <a:xfrm flipH="1" flipV="1">
+              <a:off x="10550261" y="1419749"/>
+              <a:ext cx="691412" cy="991"/>
+            </a:xfrm>
+            <a:prstGeom prst="straightConnector1">
+              <a:avLst/>
+            </a:prstGeom>
+            <a:ln>
+              <a:tailEnd type="triangle"/>
+            </a:ln>
+          </p:spPr>
+          <p:style>
+            <a:lnRef idx="1">
+              <a:schemeClr val="accent1"/>
+            </a:lnRef>
+            <a:fillRef idx="0">
+              <a:schemeClr val="accent1"/>
+            </a:fillRef>
+            <a:effectRef idx="0">
+              <a:schemeClr val="accent1"/>
+            </a:effectRef>
+            <a:fontRef idx="minor">
+              <a:schemeClr val="tx1"/>
+            </a:fontRef>
+          </p:style>
+        </p:cxnSp>
+        <p:sp>
+          <p:nvSpPr>
+            <p:cNvPr id="488" name="CustomShape 199">
+              <a:extLst>
+                <a:ext uri="{FF2B5EF4-FFF2-40B4-BE49-F238E27FC236}">
+                  <a16:creationId xmlns:a16="http://schemas.microsoft.com/office/drawing/2014/main" id="{B44D72A7-9D2D-49AA-87E3-E8361F774685}"/>
+                </a:ext>
+              </a:extLst>
+            </p:cNvPr>
+            <p:cNvSpPr/>
+            <p:nvPr/>
+          </p:nvSpPr>
+          <p:spPr>
+            <a:xfrm>
+              <a:off x="12888599" y="1738080"/>
+              <a:ext cx="866354" cy="182520"/>
+            </a:xfrm>
+            <a:prstGeom prst="rect">
+              <a:avLst/>
+            </a:prstGeom>
+            <a:solidFill>
+              <a:srgbClr val="ED7D31"/>
+            </a:solidFill>
+            <a:ln>
+              <a:solidFill>
+                <a:srgbClr val="AF5C24"/>
+              </a:solidFill>
+            </a:ln>
+          </p:spPr>
+          <p:style>
+            <a:lnRef idx="2">
+              <a:schemeClr val="accent2">
+                <a:shade val="50000"/>
+              </a:schemeClr>
+            </a:lnRef>
+            <a:fillRef idx="1">
+              <a:schemeClr val="accent2"/>
+            </a:fillRef>
+            <a:effectRef idx="0">
+              <a:schemeClr val="accent2"/>
+            </a:effectRef>
+            <a:fontRef idx="minor"/>
+          </p:style>
+          <p:txBody>
+            <a:bodyPr lIns="90000" tIns="45000" rIns="90000" bIns="45000" anchor="ctr">
+              <a:noAutofit/>
+            </a:bodyPr>
+            <a:lstStyle/>
+            <a:p>
+              <a:pPr algn="ctr">
+                <a:lnSpc>
+                  <a:spcPct val="100000"/>
+                </a:lnSpc>
+              </a:pPr>
+              <a:r>
+                <a:rPr lang="en-US" sz="1200" b="0" strike="noStrike" spc="-1" dirty="0" err="1">
+                  <a:solidFill>
+                    <a:srgbClr val="FFFFFF"/>
+                  </a:solidFill>
+                  <a:latin typeface="Calibri"/>
+                </a:rPr>
+                <a:t>TraitMatrix</a:t>
+              </a:r>
+              <a:endParaRPr lang="en-US" sz="1200" b="0" strike="noStrike" spc="-1" dirty="0">
+                <a:latin typeface="Arial"/>
+              </a:endParaRPr>
+            </a:p>
+          </p:txBody>
+        </p:sp>
+        <p:cxnSp>
+          <p:nvCxnSpPr>
+            <p:cNvPr id="493" name="Straight Arrow Connector 492">
+              <a:extLst>
+                <a:ext uri="{FF2B5EF4-FFF2-40B4-BE49-F238E27FC236}">
+                  <a16:creationId xmlns:a16="http://schemas.microsoft.com/office/drawing/2014/main" id="{080C8321-A4B8-484E-8D91-A9B49E9B0E1F}"/>
+                </a:ext>
+              </a:extLst>
+            </p:cNvPr>
+            <p:cNvCxnSpPr>
+              <a:stCxn id="488" idx="0"/>
+              <a:endCxn id="168" idx="2"/>
+            </p:cNvCxnSpPr>
+            <p:nvPr/>
+          </p:nvCxnSpPr>
+          <p:spPr>
+            <a:xfrm flipV="1">
+              <a:off x="13321776" y="1512000"/>
+              <a:ext cx="457" cy="226080"/>
+            </a:xfrm>
+            <a:prstGeom prst="straightConnector1">
+              <a:avLst/>
+            </a:prstGeom>
+            <a:ln>
+              <a:tailEnd type="triangle"/>
+            </a:ln>
+          </p:spPr>
+          <p:style>
+            <a:lnRef idx="1">
+              <a:schemeClr val="accent1"/>
+            </a:lnRef>
+            <a:fillRef idx="0">
+              <a:schemeClr val="accent1"/>
+            </a:fillRef>
+            <a:effectRef idx="0">
+              <a:schemeClr val="accent1"/>
+            </a:effectRef>
+            <a:fontRef idx="minor">
+              <a:schemeClr val="tx1"/>
+            </a:fontRef>
+          </p:style>
+        </p:cxnSp>
+        <p:sp>
+          <p:nvSpPr>
+            <p:cNvPr id="494" name="CustomShape 199">
+              <a:extLst>
+                <a:ext uri="{FF2B5EF4-FFF2-40B4-BE49-F238E27FC236}">
+                  <a16:creationId xmlns:a16="http://schemas.microsoft.com/office/drawing/2014/main" id="{5672B673-106E-413B-A51D-603D2716B6A9}"/>
+                </a:ext>
+              </a:extLst>
+            </p:cNvPr>
+            <p:cNvSpPr/>
+            <p:nvPr/>
+          </p:nvSpPr>
+          <p:spPr>
+            <a:xfrm>
+              <a:off x="11267602" y="1735920"/>
+              <a:ext cx="1061262" cy="182520"/>
+            </a:xfrm>
+            <a:prstGeom prst="rect">
+              <a:avLst/>
+            </a:prstGeom>
+            <a:solidFill>
+              <a:srgbClr val="ED7D31"/>
+            </a:solidFill>
+            <a:ln>
+              <a:solidFill>
+                <a:srgbClr val="AF5C24"/>
+              </a:solidFill>
+            </a:ln>
+          </p:spPr>
+          <p:style>
+            <a:lnRef idx="2">
+              <a:schemeClr val="accent2">
+                <a:shade val="50000"/>
+              </a:schemeClr>
+            </a:lnRef>
+            <a:fillRef idx="1">
+              <a:schemeClr val="accent2"/>
+            </a:fillRef>
+            <a:effectRef idx="0">
+              <a:schemeClr val="accent2"/>
+            </a:effectRef>
+            <a:fontRef idx="minor"/>
+          </p:style>
+          <p:txBody>
+            <a:bodyPr lIns="90000" tIns="45000" rIns="90000" bIns="45000" anchor="ctr">
+              <a:noAutofit/>
+            </a:bodyPr>
+            <a:lstStyle/>
+            <a:p>
+              <a:pPr algn="ctr">
+                <a:lnSpc>
+                  <a:spcPct val="100000"/>
+                </a:lnSpc>
+              </a:pPr>
+              <a:r>
+                <a:rPr lang="en-US" sz="1200" b="0" strike="noStrike" spc="-1" dirty="0" err="1">
+                  <a:solidFill>
+                    <a:srgbClr val="FFFFFF"/>
+                  </a:solidFill>
+                  <a:latin typeface="Calibri"/>
+                </a:rPr>
+                <a:t>PhasedMatrix</a:t>
+              </a:r>
+              <a:endParaRPr lang="en-US" sz="1200" b="0" strike="noStrike" spc="-1" dirty="0">
+                <a:latin typeface="Arial"/>
+              </a:endParaRPr>
+            </a:p>
+          </p:txBody>
+        </p:sp>
+        <p:cxnSp>
+          <p:nvCxnSpPr>
+            <p:cNvPr id="496" name="Straight Arrow Connector 495">
+              <a:extLst>
+                <a:ext uri="{FF2B5EF4-FFF2-40B4-BE49-F238E27FC236}">
+                  <a16:creationId xmlns:a16="http://schemas.microsoft.com/office/drawing/2014/main" id="{C88AADA4-A312-46C6-A3FF-8379BF698C8B}"/>
+                </a:ext>
+              </a:extLst>
+            </p:cNvPr>
+            <p:cNvCxnSpPr>
+              <a:stCxn id="494" idx="0"/>
+              <a:endCxn id="482" idx="2"/>
+            </p:cNvCxnSpPr>
+            <p:nvPr/>
+          </p:nvCxnSpPr>
+          <p:spPr>
+            <a:xfrm flipV="1">
+              <a:off x="11798233" y="1512000"/>
+              <a:ext cx="0" cy="223920"/>
+            </a:xfrm>
+            <a:prstGeom prst="straightConnector1">
+              <a:avLst/>
+            </a:prstGeom>
+            <a:ln>
+              <a:tailEnd type="triangle"/>
+            </a:ln>
+          </p:spPr>
+          <p:style>
+            <a:lnRef idx="1">
+              <a:schemeClr val="accent1"/>
+            </a:lnRef>
+            <a:fillRef idx="0">
+              <a:schemeClr val="accent1"/>
+            </a:fillRef>
+            <a:effectRef idx="0">
+              <a:schemeClr val="accent1"/>
+            </a:effectRef>
+            <a:fontRef idx="minor">
+              <a:schemeClr val="tx1"/>
+            </a:fontRef>
+          </p:style>
+        </p:cxnSp>
+      </p:grpSp>
+      <p:sp>
+        <p:nvSpPr>
+          <p:cNvPr id="500" name="CustomShape 200">
+            <a:extLst>
+              <a:ext uri="{FF2B5EF4-FFF2-40B4-BE49-F238E27FC236}">
+                <a16:creationId xmlns:a16="http://schemas.microsoft.com/office/drawing/2014/main" id="{D8E6F1B0-454D-4D6D-8CED-71180525A5A2}"/>
+              </a:ext>
+            </a:extLst>
+          </p:cNvPr>
+          <p:cNvSpPr/>
+          <p:nvPr/>
+        </p:nvSpPr>
+        <p:spPr>
+          <a:xfrm>
+            <a:off x="10371175" y="840529"/>
+            <a:ext cx="981832" cy="182520"/>
+          </a:xfrm>
+          <a:prstGeom prst="rect">
+            <a:avLst/>
+          </a:prstGeom>
+          <a:ln/>
+        </p:spPr>
+        <p:style>
+          <a:lnRef idx="2">
+            <a:schemeClr val="accent1">
+              <a:shade val="50000"/>
+            </a:schemeClr>
+          </a:lnRef>
+          <a:fillRef idx="1">
+            <a:schemeClr val="accent1"/>
+          </a:fillRef>
+          <a:effectRef idx="0">
+            <a:schemeClr val="accent1"/>
+          </a:effectRef>
+          <a:fontRef idx="minor">
+            <a:schemeClr val="lt1"/>
+          </a:fontRef>
+        </p:style>
+        <p:txBody>
+          <a:bodyPr lIns="90000" tIns="45000" rIns="90000" bIns="45000" anchor="ctr">
+            <a:noAutofit/>
+          </a:bodyPr>
+          <a:lstStyle/>
+          <a:p>
+            <a:pPr algn="ctr">
+              <a:lnSpc>
+                <a:spcPct val="100000"/>
+              </a:lnSpc>
+            </a:pPr>
+            <a:r>
+              <a:rPr lang="en-US" sz="1200" b="0" strike="noStrike" spc="-1" dirty="0" err="1">
+                <a:solidFill>
+                  <a:srgbClr val="FFFFFF"/>
+                </a:solidFill>
+                <a:latin typeface="Calibri"/>
+              </a:rPr>
+              <a:t>DenseMatrix</a:t>
+            </a:r>
+            <a:endParaRPr lang="en-US" sz="1200" b="0" strike="noStrike" spc="-1" dirty="0">
+              <a:latin typeface="Arial"/>
+            </a:endParaRPr>
+          </a:p>
+        </p:txBody>
+      </p:sp>
+      <p:sp>
+        <p:nvSpPr>
+          <p:cNvPr id="501" name="CustomShape 200">
+            <a:extLst>
+              <a:ext uri="{FF2B5EF4-FFF2-40B4-BE49-F238E27FC236}">
+                <a16:creationId xmlns:a16="http://schemas.microsoft.com/office/drawing/2014/main" id="{96BB6811-97D5-4020-90AC-35DC1DC84E2C}"/>
+              </a:ext>
+            </a:extLst>
+          </p:cNvPr>
+          <p:cNvSpPr/>
+          <p:nvPr/>
+        </p:nvSpPr>
+        <p:spPr>
+          <a:xfrm>
+            <a:off x="11658649" y="838260"/>
+            <a:ext cx="1532440" cy="182520"/>
+          </a:xfrm>
+          <a:prstGeom prst="rect">
+            <a:avLst/>
+          </a:prstGeom>
+          <a:ln/>
+        </p:spPr>
+        <p:style>
+          <a:lnRef idx="2">
+            <a:schemeClr val="accent1">
+              <a:shade val="50000"/>
+            </a:schemeClr>
+          </a:lnRef>
+          <a:fillRef idx="1">
+            <a:schemeClr val="accent1"/>
+          </a:fillRef>
+          <a:effectRef idx="0">
+            <a:schemeClr val="accent1"/>
+          </a:effectRef>
+          <a:fontRef idx="minor">
+            <a:schemeClr val="lt1"/>
+          </a:fontRef>
+        </p:style>
+        <p:txBody>
+          <a:bodyPr lIns="90000" tIns="45000" rIns="90000" bIns="45000" anchor="ctr">
+            <a:noAutofit/>
+          </a:bodyPr>
+          <a:lstStyle/>
+          <a:p>
+            <a:pPr algn="ctr">
+              <a:lnSpc>
+                <a:spcPct val="100000"/>
+              </a:lnSpc>
+            </a:pPr>
+            <a:r>
+              <a:rPr lang="en-US" sz="1200" b="0" strike="noStrike" spc="-1" dirty="0" err="1">
+                <a:solidFill>
+                  <a:srgbClr val="FFFFFF"/>
+                </a:solidFill>
+                <a:latin typeface="Calibri"/>
+              </a:rPr>
+              <a:t>DenseMutableMatrix</a:t>
+            </a:r>
+            <a:endParaRPr lang="en-US" sz="1200" b="0" strike="noStrike" spc="-1" dirty="0">
+              <a:latin typeface="Arial"/>
+            </a:endParaRPr>
+          </a:p>
+        </p:txBody>
+      </p:sp>
+      <p:cxnSp>
+        <p:nvCxnSpPr>
+          <p:cNvPr id="506" name="Straight Arrow Connector 505">
+            <a:extLst>
+              <a:ext uri="{FF2B5EF4-FFF2-40B4-BE49-F238E27FC236}">
+                <a16:creationId xmlns:a16="http://schemas.microsoft.com/office/drawing/2014/main" id="{4D2A1747-4FCD-44A6-8E0D-B3B9FB7382FE}"/>
+              </a:ext>
+            </a:extLst>
+          </p:cNvPr>
+          <p:cNvCxnSpPr>
+            <a:stCxn id="500" idx="2"/>
+            <a:endCxn id="169" idx="0"/>
+          </p:cNvCxnSpPr>
+          <p:nvPr/>
+        </p:nvCxnSpPr>
+        <p:spPr>
+          <a:xfrm>
+            <a:off x="10862091" y="1023049"/>
+            <a:ext cx="366" cy="290320"/>
+          </a:xfrm>
+          <a:prstGeom prst="straightConnector1">
+            <a:avLst/>
+          </a:prstGeom>
+          <a:ln>
+            <a:tailEnd type="triangle"/>
+          </a:ln>
+        </p:spPr>
+        <p:style>
+          <a:lnRef idx="1">
+            <a:schemeClr val="accent1"/>
+          </a:lnRef>
+          <a:fillRef idx="0">
+            <a:schemeClr val="accent1"/>
+          </a:fillRef>
+          <a:effectRef idx="0">
+            <a:schemeClr val="accent1"/>
+          </a:effectRef>
+          <a:fontRef idx="minor">
+            <a:schemeClr val="tx1"/>
+          </a:fontRef>
+        </p:style>
+      </p:cxnSp>
+      <p:cxnSp>
+        <p:nvCxnSpPr>
+          <p:cNvPr id="522" name="Straight Arrow Connector 521">
+            <a:extLst>
+              <a:ext uri="{FF2B5EF4-FFF2-40B4-BE49-F238E27FC236}">
+                <a16:creationId xmlns:a16="http://schemas.microsoft.com/office/drawing/2014/main" id="{FA202D68-2421-4CF1-BF6F-E5885B688AA2}"/>
+              </a:ext>
+            </a:extLst>
+          </p:cNvPr>
+          <p:cNvCxnSpPr>
+            <a:stCxn id="501" idx="2"/>
+            <a:endCxn id="482" idx="0"/>
+          </p:cNvCxnSpPr>
+          <p:nvPr/>
+        </p:nvCxnSpPr>
+        <p:spPr>
+          <a:xfrm>
+            <a:off x="12424869" y="1020780"/>
+            <a:ext cx="560" cy="293580"/>
+          </a:xfrm>
+          <a:prstGeom prst="straightConnector1">
+            <a:avLst/>
+          </a:prstGeom>
+          <a:ln>
+            <a:tailEnd type="triangle"/>
+          </a:ln>
+        </p:spPr>
+        <p:style>
+          <a:lnRef idx="1">
+            <a:schemeClr val="accent1"/>
+          </a:lnRef>
+          <a:fillRef idx="0">
+            <a:schemeClr val="accent1"/>
+          </a:fillRef>
+          <a:effectRef idx="0">
+            <a:schemeClr val="accent1"/>
+          </a:effectRef>
+          <a:fontRef idx="minor">
+            <a:schemeClr val="tx1"/>
+          </a:fontRef>
+        </p:style>
+      </p:cxnSp>
+      <p:cxnSp>
+        <p:nvCxnSpPr>
+          <p:cNvPr id="524" name="Straight Arrow Connector 523">
+            <a:extLst>
+              <a:ext uri="{FF2B5EF4-FFF2-40B4-BE49-F238E27FC236}">
+                <a16:creationId xmlns:a16="http://schemas.microsoft.com/office/drawing/2014/main" id="{9FB6AA08-44B4-4BC5-B1EC-897AA0E7D6A8}"/>
+              </a:ext>
+            </a:extLst>
+          </p:cNvPr>
+          <p:cNvCxnSpPr>
+            <a:stCxn id="501" idx="1"/>
+            <a:endCxn id="500" idx="3"/>
+          </p:cNvCxnSpPr>
+          <p:nvPr/>
+        </p:nvCxnSpPr>
+        <p:spPr>
+          <a:xfrm flipH="1">
+            <a:off x="11353007" y="929520"/>
+            <a:ext cx="305642" cy="2269"/>
+          </a:xfrm>
+          <a:prstGeom prst="straightConnector1">
+            <a:avLst/>
+          </a:prstGeom>
+          <a:ln>
+            <a:tailEnd type="triangle"/>
+          </a:ln>
+        </p:spPr>
+        <p:style>
+          <a:lnRef idx="1">
+            <a:schemeClr val="accent1"/>
+          </a:lnRef>
+          <a:fillRef idx="0">
+            <a:schemeClr val="accent1"/>
+          </a:fillRef>
+          <a:effectRef idx="0">
+            <a:schemeClr val="accent1"/>
+          </a:effectRef>
+          <a:fontRef idx="minor">
+            <a:schemeClr val="tx1"/>
+          </a:fontRef>
+        </p:style>
+      </p:cxnSp>
     </p:spTree>
     <p:extLst>
       <p:ext uri="{BB962C8B-B14F-4D97-AF65-F5344CB8AC3E}">

</xml_diff>